<commit_message>
removing part of rua 6
</commit_message>
<xml_diff>
--- a/src/graphics-design/sign/sign-barcode-header/sign-barcode-header.pptx
+++ b/src/graphics-design/sign/sign-barcode-header/sign-barcode-header.pptx
@@ -13,6 +13,10 @@
     <p:sldId id="262" r:id="rId7"/>
     <p:sldId id="263" r:id="rId8"/>
     <p:sldId id="264" r:id="rId9"/>
+    <p:sldId id="265" r:id="rId10"/>
+    <p:sldId id="266" r:id="rId11"/>
+    <p:sldId id="267" r:id="rId12"/>
+    <p:sldId id="268" r:id="rId13"/>
   </p:sldIdLst>
   <p:sldSz cx="5562600" cy="1096963"/>
   <p:notesSz cx="9144000" cy="6858000"/>
@@ -250,7 +254,7 @@
           <a:p>
             <a:fld id="{2D9AFD49-2911-40A0-8C34-1C3909DA5CA6}" type="datetimeFigureOut">
               <a:rPr lang="en-US" smtClean="0"/>
-              <a:t>6/10/2020</a:t>
+              <a:t>6/16/2020</a:t>
             </a:fld>
             <a:endParaRPr lang="en-US"/>
           </a:p>
@@ -420,7 +424,7 @@
           <a:p>
             <a:fld id="{2D9AFD49-2911-40A0-8C34-1C3909DA5CA6}" type="datetimeFigureOut">
               <a:rPr lang="en-US" smtClean="0"/>
-              <a:t>6/10/2020</a:t>
+              <a:t>6/16/2020</a:t>
             </a:fld>
             <a:endParaRPr lang="en-US"/>
           </a:p>
@@ -600,7 +604,7 @@
           <a:p>
             <a:fld id="{2D9AFD49-2911-40A0-8C34-1C3909DA5CA6}" type="datetimeFigureOut">
               <a:rPr lang="en-US" smtClean="0"/>
-              <a:t>6/10/2020</a:t>
+              <a:t>6/16/2020</a:t>
             </a:fld>
             <a:endParaRPr lang="en-US"/>
           </a:p>
@@ -770,7 +774,7 @@
           <a:p>
             <a:fld id="{2D9AFD49-2911-40A0-8C34-1C3909DA5CA6}" type="datetimeFigureOut">
               <a:rPr lang="en-US" smtClean="0"/>
-              <a:t>6/10/2020</a:t>
+              <a:t>6/16/2020</a:t>
             </a:fld>
             <a:endParaRPr lang="en-US"/>
           </a:p>
@@ -1016,7 +1020,7 @@
           <a:p>
             <a:fld id="{2D9AFD49-2911-40A0-8C34-1C3909DA5CA6}" type="datetimeFigureOut">
               <a:rPr lang="en-US" smtClean="0"/>
-              <a:t>6/10/2020</a:t>
+              <a:t>6/16/2020</a:t>
             </a:fld>
             <a:endParaRPr lang="en-US"/>
           </a:p>
@@ -1248,7 +1252,7 @@
           <a:p>
             <a:fld id="{2D9AFD49-2911-40A0-8C34-1C3909DA5CA6}" type="datetimeFigureOut">
               <a:rPr lang="en-US" smtClean="0"/>
-              <a:t>6/10/2020</a:t>
+              <a:t>6/16/2020</a:t>
             </a:fld>
             <a:endParaRPr lang="en-US"/>
           </a:p>
@@ -1615,7 +1619,7 @@
           <a:p>
             <a:fld id="{2D9AFD49-2911-40A0-8C34-1C3909DA5CA6}" type="datetimeFigureOut">
               <a:rPr lang="en-US" smtClean="0"/>
-              <a:t>6/10/2020</a:t>
+              <a:t>6/16/2020</a:t>
             </a:fld>
             <a:endParaRPr lang="en-US"/>
           </a:p>
@@ -1733,7 +1737,7 @@
           <a:p>
             <a:fld id="{2D9AFD49-2911-40A0-8C34-1C3909DA5CA6}" type="datetimeFigureOut">
               <a:rPr lang="en-US" smtClean="0"/>
-              <a:t>6/10/2020</a:t>
+              <a:t>6/16/2020</a:t>
             </a:fld>
             <a:endParaRPr lang="en-US"/>
           </a:p>
@@ -1828,7 +1832,7 @@
           <a:p>
             <a:fld id="{2D9AFD49-2911-40A0-8C34-1C3909DA5CA6}" type="datetimeFigureOut">
               <a:rPr lang="en-US" smtClean="0"/>
-              <a:t>6/10/2020</a:t>
+              <a:t>6/16/2020</a:t>
             </a:fld>
             <a:endParaRPr lang="en-US"/>
           </a:p>
@@ -2105,7 +2109,7 @@
           <a:p>
             <a:fld id="{2D9AFD49-2911-40A0-8C34-1C3909DA5CA6}" type="datetimeFigureOut">
               <a:rPr lang="en-US" smtClean="0"/>
-              <a:t>6/10/2020</a:t>
+              <a:t>6/16/2020</a:t>
             </a:fld>
             <a:endParaRPr lang="en-US"/>
           </a:p>
@@ -2362,7 +2366,7 @@
           <a:p>
             <a:fld id="{2D9AFD49-2911-40A0-8C34-1C3909DA5CA6}" type="datetimeFigureOut">
               <a:rPr lang="en-US" smtClean="0"/>
-              <a:t>6/10/2020</a:t>
+              <a:t>6/16/2020</a:t>
             </a:fld>
             <a:endParaRPr lang="en-US"/>
           </a:p>
@@ -2575,7 +2579,7 @@
           <a:p>
             <a:fld id="{2D9AFD49-2911-40A0-8C34-1C3909DA5CA6}" type="datetimeFigureOut">
               <a:rPr lang="en-US" smtClean="0"/>
-              <a:t>6/10/2020</a:t>
+              <a:t>6/16/2020</a:t>
             </a:fld>
             <a:endParaRPr lang="en-US"/>
           </a:p>
@@ -3001,7 +3005,7 @@
             <a:avLst/>
           </a:prstGeom>
           <a:solidFill>
-            <a:srgbClr val="FFFF00"/>
+            <a:srgbClr val="FFF112"/>
           </a:solidFill>
           <a:ln>
             <a:noFill/>
@@ -3058,7 +3062,7 @@
             <a:avLst/>
           </a:prstGeom>
           <a:solidFill>
-            <a:srgbClr val="FFFF00"/>
+            <a:srgbClr val="FFF112"/>
           </a:solidFill>
           <a:ln>
             <a:noFill/>
@@ -3240,6 +3244,864 @@
     <p:extLst>
       <p:ext uri="{BB962C8B-B14F-4D97-AF65-F5344CB8AC3E}">
         <p14:creationId xmlns:p14="http://schemas.microsoft.com/office/powerpoint/2010/main" val="21938196"/>
+      </p:ext>
+    </p:extLst>
+  </p:cSld>
+  <p:clrMapOvr>
+    <a:masterClrMapping/>
+  </p:clrMapOvr>
+</p:sld>
+</file>
+
+<file path=ppt/slides/slide10.xml><?xml version="1.0" encoding="utf-8"?>
+<p:sld xmlns:a="http://schemas.openxmlformats.org/drawingml/2006/main" xmlns:r="http://schemas.openxmlformats.org/officeDocument/2006/relationships" xmlns:p="http://schemas.openxmlformats.org/presentationml/2006/main">
+  <p:cSld>
+    <p:spTree>
+      <p:nvGrpSpPr>
+        <p:cNvPr id="1" name=""/>
+        <p:cNvGrpSpPr/>
+        <p:nvPr/>
+      </p:nvGrpSpPr>
+      <p:grpSpPr>
+        <a:xfrm>
+          <a:off x="0" y="0"/>
+          <a:ext cx="0" cy="0"/>
+          <a:chOff x="0" y="0"/>
+          <a:chExt cx="0" cy="0"/>
+        </a:xfrm>
+      </p:grpSpPr>
+      <p:sp>
+        <p:nvSpPr>
+          <p:cNvPr id="6" name="Rectangle 5">
+            <a:extLst>
+              <a:ext uri="{FF2B5EF4-FFF2-40B4-BE49-F238E27FC236}">
+                <a16:creationId xmlns:a16="http://schemas.microsoft.com/office/drawing/2014/main" id="{140EBB1C-E574-4824-8739-E838CE96078D}"/>
+              </a:ext>
+            </a:extLst>
+          </p:cNvPr>
+          <p:cNvSpPr/>
+          <p:nvPr/>
+        </p:nvSpPr>
+        <p:spPr>
+          <a:xfrm>
+            <a:off x="0" y="296863"/>
+            <a:ext cx="2177808" cy="800100"/>
+          </a:xfrm>
+          <a:prstGeom prst="rect">
+            <a:avLst/>
+          </a:prstGeom>
+          <a:solidFill>
+            <a:srgbClr val="606062"/>
+          </a:solidFill>
+          <a:ln>
+            <a:noFill/>
+          </a:ln>
+        </p:spPr>
+        <p:style>
+          <a:lnRef idx="2">
+            <a:schemeClr val="accent1">
+              <a:shade val="50000"/>
+            </a:schemeClr>
+          </a:lnRef>
+          <a:fillRef idx="1">
+            <a:schemeClr val="accent1"/>
+          </a:fillRef>
+          <a:effectRef idx="0">
+            <a:schemeClr val="accent1"/>
+          </a:effectRef>
+          <a:fontRef idx="minor">
+            <a:schemeClr val="lt1"/>
+          </a:fontRef>
+        </p:style>
+        <p:txBody>
+          <a:bodyPr rot="0" spcFirstLastPara="0" vertOverflow="overflow" horzOverflow="overflow" vert="horz" wrap="square" lIns="91440" tIns="45719" rIns="91440" bIns="45719" numCol="1" spcCol="0" rtlCol="0" fromWordArt="0" anchor="ctr" anchorCtr="0" forceAA="0" compatLnSpc="1">
+            <a:prstTxWarp prst="textNoShape">
+              <a:avLst/>
+            </a:prstTxWarp>
+            <a:noAutofit/>
+          </a:bodyPr>
+          <a:lstStyle/>
+          <a:p>
+            <a:pPr algn="ctr"/>
+            <a:endParaRPr lang="en-US"/>
+          </a:p>
+        </p:txBody>
+      </p:sp>
+      <p:sp>
+        <p:nvSpPr>
+          <p:cNvPr id="7" name="Rectangle 6">
+            <a:extLst>
+              <a:ext uri="{FF2B5EF4-FFF2-40B4-BE49-F238E27FC236}">
+                <a16:creationId xmlns:a16="http://schemas.microsoft.com/office/drawing/2014/main" id="{E139999D-85F3-4FA3-B90B-6E69F95DB000}"/>
+              </a:ext>
+            </a:extLst>
+          </p:cNvPr>
+          <p:cNvSpPr/>
+          <p:nvPr/>
+        </p:nvSpPr>
+        <p:spPr>
+          <a:xfrm>
+            <a:off x="3384794" y="296863"/>
+            <a:ext cx="2177808" cy="800100"/>
+          </a:xfrm>
+          <a:prstGeom prst="rect">
+            <a:avLst/>
+          </a:prstGeom>
+          <a:solidFill>
+            <a:srgbClr val="606062"/>
+          </a:solidFill>
+          <a:ln>
+            <a:noFill/>
+          </a:ln>
+        </p:spPr>
+        <p:style>
+          <a:lnRef idx="2">
+            <a:schemeClr val="accent1">
+              <a:shade val="50000"/>
+            </a:schemeClr>
+          </a:lnRef>
+          <a:fillRef idx="1">
+            <a:schemeClr val="accent1"/>
+          </a:fillRef>
+          <a:effectRef idx="0">
+            <a:schemeClr val="accent1"/>
+          </a:effectRef>
+          <a:fontRef idx="minor">
+            <a:schemeClr val="lt1"/>
+          </a:fontRef>
+        </p:style>
+        <p:txBody>
+          <a:bodyPr rot="0" spcFirstLastPara="0" vertOverflow="overflow" horzOverflow="overflow" vert="horz" wrap="square" lIns="91440" tIns="45719" rIns="91440" bIns="45719" numCol="1" spcCol="0" rtlCol="0" fromWordArt="0" anchor="ctr" anchorCtr="0" forceAA="0" compatLnSpc="1">
+            <a:prstTxWarp prst="textNoShape">
+              <a:avLst/>
+            </a:prstTxWarp>
+            <a:noAutofit/>
+          </a:bodyPr>
+          <a:lstStyle/>
+          <a:p>
+            <a:pPr algn="ctr"/>
+            <a:endParaRPr lang="en-US"/>
+          </a:p>
+        </p:txBody>
+      </p:sp>
+      <p:sp>
+        <p:nvSpPr>
+          <p:cNvPr id="9" name="TextBox 8">
+            <a:extLst>
+              <a:ext uri="{FF2B5EF4-FFF2-40B4-BE49-F238E27FC236}">
+                <a16:creationId xmlns:a16="http://schemas.microsoft.com/office/drawing/2014/main" id="{0D0CA72B-F56B-4767-8F95-65783756DAB7}"/>
+              </a:ext>
+            </a:extLst>
+          </p:cNvPr>
+          <p:cNvSpPr txBox="1"/>
+          <p:nvPr/>
+        </p:nvSpPr>
+        <p:spPr>
+          <a:xfrm>
+            <a:off x="1965960" y="96749"/>
+            <a:ext cx="1630680" cy="1200329"/>
+          </a:xfrm>
+          <a:prstGeom prst="rect">
+            <a:avLst/>
+          </a:prstGeom>
+          <a:noFill/>
+        </p:spPr>
+        <p:txBody>
+          <a:bodyPr wrap="square" rtlCol="0">
+            <a:spAutoFit/>
+          </a:bodyPr>
+          <a:lstStyle/>
+          <a:p>
+            <a:pPr algn="ctr"/>
+            <a:r>
+              <a:rPr lang="en-US" sz="7200" dirty="0">
+                <a:latin typeface="Bahnschrift" panose="020B0502040204020203" pitchFamily="34" charset="0"/>
+              </a:rPr>
+              <a:t>10</a:t>
+            </a:r>
+          </a:p>
+        </p:txBody>
+      </p:sp>
+      <p:sp>
+        <p:nvSpPr>
+          <p:cNvPr id="10" name="Rectangle 9">
+            <a:extLst>
+              <a:ext uri="{FF2B5EF4-FFF2-40B4-BE49-F238E27FC236}">
+                <a16:creationId xmlns:a16="http://schemas.microsoft.com/office/drawing/2014/main" id="{E27AD04B-6A09-4426-B971-B6F66FA34B6F}"/>
+              </a:ext>
+            </a:extLst>
+          </p:cNvPr>
+          <p:cNvSpPr/>
+          <p:nvPr/>
+        </p:nvSpPr>
+        <p:spPr>
+          <a:xfrm>
+            <a:off x="-2" y="0"/>
+            <a:ext cx="269083" cy="1096963"/>
+          </a:xfrm>
+          <a:prstGeom prst="rect">
+            <a:avLst/>
+          </a:prstGeom>
+          <a:solidFill>
+            <a:schemeClr val="bg1"/>
+          </a:solidFill>
+          <a:ln>
+            <a:noFill/>
+          </a:ln>
+        </p:spPr>
+        <p:style>
+          <a:lnRef idx="2">
+            <a:schemeClr val="accent1">
+              <a:shade val="50000"/>
+            </a:schemeClr>
+          </a:lnRef>
+          <a:fillRef idx="1">
+            <a:schemeClr val="accent1"/>
+          </a:fillRef>
+          <a:effectRef idx="0">
+            <a:schemeClr val="accent1"/>
+          </a:effectRef>
+          <a:fontRef idx="minor">
+            <a:schemeClr val="lt1"/>
+          </a:fontRef>
+        </p:style>
+        <p:txBody>
+          <a:bodyPr rtlCol="0" anchor="ctr"/>
+          <a:lstStyle/>
+          <a:p>
+            <a:pPr algn="ctr"/>
+            <a:endParaRPr lang="en-US"/>
+          </a:p>
+        </p:txBody>
+      </p:sp>
+      <p:sp>
+        <p:nvSpPr>
+          <p:cNvPr id="11" name="Rectangle 10">
+            <a:extLst>
+              <a:ext uri="{FF2B5EF4-FFF2-40B4-BE49-F238E27FC236}">
+                <a16:creationId xmlns:a16="http://schemas.microsoft.com/office/drawing/2014/main" id="{378DE5BB-2061-484F-ACBB-0D94EFCF1D57}"/>
+              </a:ext>
+            </a:extLst>
+          </p:cNvPr>
+          <p:cNvSpPr/>
+          <p:nvPr/>
+        </p:nvSpPr>
+        <p:spPr>
+          <a:xfrm>
+            <a:off x="5293519" y="-1"/>
+            <a:ext cx="269083" cy="1096963"/>
+          </a:xfrm>
+          <a:prstGeom prst="rect">
+            <a:avLst/>
+          </a:prstGeom>
+          <a:solidFill>
+            <a:schemeClr val="bg1"/>
+          </a:solidFill>
+          <a:ln>
+            <a:noFill/>
+          </a:ln>
+        </p:spPr>
+        <p:style>
+          <a:lnRef idx="2">
+            <a:schemeClr val="accent1">
+              <a:shade val="50000"/>
+            </a:schemeClr>
+          </a:lnRef>
+          <a:fillRef idx="1">
+            <a:schemeClr val="accent1"/>
+          </a:fillRef>
+          <a:effectRef idx="0">
+            <a:schemeClr val="accent1"/>
+          </a:effectRef>
+          <a:fontRef idx="minor">
+            <a:schemeClr val="lt1"/>
+          </a:fontRef>
+        </p:style>
+        <p:txBody>
+          <a:bodyPr rtlCol="0" anchor="ctr"/>
+          <a:lstStyle/>
+          <a:p>
+            <a:pPr algn="ctr"/>
+            <a:endParaRPr lang="en-US"/>
+          </a:p>
+        </p:txBody>
+      </p:sp>
+    </p:spTree>
+    <p:extLst>
+      <p:ext uri="{BB962C8B-B14F-4D97-AF65-F5344CB8AC3E}">
+        <p14:creationId xmlns:p14="http://schemas.microsoft.com/office/powerpoint/2010/main" val="3343126492"/>
+      </p:ext>
+    </p:extLst>
+  </p:cSld>
+  <p:clrMapOvr>
+    <a:masterClrMapping/>
+  </p:clrMapOvr>
+</p:sld>
+</file>
+
+<file path=ppt/slides/slide11.xml><?xml version="1.0" encoding="utf-8"?>
+<p:sld xmlns:a="http://schemas.openxmlformats.org/drawingml/2006/main" xmlns:r="http://schemas.openxmlformats.org/officeDocument/2006/relationships" xmlns:p="http://schemas.openxmlformats.org/presentationml/2006/main">
+  <p:cSld>
+    <p:spTree>
+      <p:nvGrpSpPr>
+        <p:cNvPr id="1" name=""/>
+        <p:cNvGrpSpPr/>
+        <p:nvPr/>
+      </p:nvGrpSpPr>
+      <p:grpSpPr>
+        <a:xfrm>
+          <a:off x="0" y="0"/>
+          <a:ext cx="0" cy="0"/>
+          <a:chOff x="0" y="0"/>
+          <a:chExt cx="0" cy="0"/>
+        </a:xfrm>
+      </p:grpSpPr>
+      <p:sp>
+        <p:nvSpPr>
+          <p:cNvPr id="6" name="Rectangle 5">
+            <a:extLst>
+              <a:ext uri="{FF2B5EF4-FFF2-40B4-BE49-F238E27FC236}">
+                <a16:creationId xmlns:a16="http://schemas.microsoft.com/office/drawing/2014/main" id="{140EBB1C-E574-4824-8739-E838CE96078D}"/>
+              </a:ext>
+            </a:extLst>
+          </p:cNvPr>
+          <p:cNvSpPr/>
+          <p:nvPr/>
+        </p:nvSpPr>
+        <p:spPr>
+          <a:xfrm>
+            <a:off x="0" y="296863"/>
+            <a:ext cx="2177808" cy="800100"/>
+          </a:xfrm>
+          <a:prstGeom prst="rect">
+            <a:avLst/>
+          </a:prstGeom>
+          <a:solidFill>
+            <a:srgbClr val="F4AE1A"/>
+          </a:solidFill>
+          <a:ln>
+            <a:noFill/>
+          </a:ln>
+        </p:spPr>
+        <p:style>
+          <a:lnRef idx="2">
+            <a:schemeClr val="accent1">
+              <a:shade val="50000"/>
+            </a:schemeClr>
+          </a:lnRef>
+          <a:fillRef idx="1">
+            <a:schemeClr val="accent1"/>
+          </a:fillRef>
+          <a:effectRef idx="0">
+            <a:schemeClr val="accent1"/>
+          </a:effectRef>
+          <a:fontRef idx="minor">
+            <a:schemeClr val="lt1"/>
+          </a:fontRef>
+        </p:style>
+        <p:txBody>
+          <a:bodyPr rot="0" spcFirstLastPara="0" vertOverflow="overflow" horzOverflow="overflow" vert="horz" wrap="square" lIns="91440" tIns="45719" rIns="91440" bIns="45719" numCol="1" spcCol="0" rtlCol="0" fromWordArt="0" anchor="ctr" anchorCtr="0" forceAA="0" compatLnSpc="1">
+            <a:prstTxWarp prst="textNoShape">
+              <a:avLst/>
+            </a:prstTxWarp>
+            <a:noAutofit/>
+          </a:bodyPr>
+          <a:lstStyle/>
+          <a:p>
+            <a:pPr algn="ctr"/>
+            <a:endParaRPr lang="en-US"/>
+          </a:p>
+        </p:txBody>
+      </p:sp>
+      <p:sp>
+        <p:nvSpPr>
+          <p:cNvPr id="7" name="Rectangle 6">
+            <a:extLst>
+              <a:ext uri="{FF2B5EF4-FFF2-40B4-BE49-F238E27FC236}">
+                <a16:creationId xmlns:a16="http://schemas.microsoft.com/office/drawing/2014/main" id="{E139999D-85F3-4FA3-B90B-6E69F95DB000}"/>
+              </a:ext>
+            </a:extLst>
+          </p:cNvPr>
+          <p:cNvSpPr/>
+          <p:nvPr/>
+        </p:nvSpPr>
+        <p:spPr>
+          <a:xfrm>
+            <a:off x="3384794" y="296863"/>
+            <a:ext cx="2177808" cy="800100"/>
+          </a:xfrm>
+          <a:prstGeom prst="rect">
+            <a:avLst/>
+          </a:prstGeom>
+          <a:solidFill>
+            <a:srgbClr val="F4AE1A"/>
+          </a:solidFill>
+          <a:ln>
+            <a:noFill/>
+          </a:ln>
+        </p:spPr>
+        <p:style>
+          <a:lnRef idx="2">
+            <a:schemeClr val="accent1">
+              <a:shade val="50000"/>
+            </a:schemeClr>
+          </a:lnRef>
+          <a:fillRef idx="1">
+            <a:schemeClr val="accent1"/>
+          </a:fillRef>
+          <a:effectRef idx="0">
+            <a:schemeClr val="accent1"/>
+          </a:effectRef>
+          <a:fontRef idx="minor">
+            <a:schemeClr val="lt1"/>
+          </a:fontRef>
+        </p:style>
+        <p:txBody>
+          <a:bodyPr rot="0" spcFirstLastPara="0" vertOverflow="overflow" horzOverflow="overflow" vert="horz" wrap="square" lIns="91440" tIns="45719" rIns="91440" bIns="45719" numCol="1" spcCol="0" rtlCol="0" fromWordArt="0" anchor="ctr" anchorCtr="0" forceAA="0" compatLnSpc="1">
+            <a:prstTxWarp prst="textNoShape">
+              <a:avLst/>
+            </a:prstTxWarp>
+            <a:noAutofit/>
+          </a:bodyPr>
+          <a:lstStyle/>
+          <a:p>
+            <a:pPr algn="ctr"/>
+            <a:endParaRPr lang="en-US"/>
+          </a:p>
+        </p:txBody>
+      </p:sp>
+      <p:sp>
+        <p:nvSpPr>
+          <p:cNvPr id="9" name="TextBox 8">
+            <a:extLst>
+              <a:ext uri="{FF2B5EF4-FFF2-40B4-BE49-F238E27FC236}">
+                <a16:creationId xmlns:a16="http://schemas.microsoft.com/office/drawing/2014/main" id="{0D0CA72B-F56B-4767-8F95-65783756DAB7}"/>
+              </a:ext>
+            </a:extLst>
+          </p:cNvPr>
+          <p:cNvSpPr txBox="1"/>
+          <p:nvPr/>
+        </p:nvSpPr>
+        <p:spPr>
+          <a:xfrm>
+            <a:off x="1965960" y="96749"/>
+            <a:ext cx="1630680" cy="1200329"/>
+          </a:xfrm>
+          <a:prstGeom prst="rect">
+            <a:avLst/>
+          </a:prstGeom>
+          <a:noFill/>
+        </p:spPr>
+        <p:txBody>
+          <a:bodyPr wrap="square" rtlCol="0">
+            <a:spAutoFit/>
+          </a:bodyPr>
+          <a:lstStyle/>
+          <a:p>
+            <a:pPr algn="ctr"/>
+            <a:r>
+              <a:rPr lang="en-US" sz="7200" dirty="0">
+                <a:latin typeface="Bahnschrift" panose="020B0502040204020203" pitchFamily="34" charset="0"/>
+              </a:rPr>
+              <a:t>11</a:t>
+            </a:r>
+          </a:p>
+        </p:txBody>
+      </p:sp>
+      <p:sp>
+        <p:nvSpPr>
+          <p:cNvPr id="10" name="Rectangle 9">
+            <a:extLst>
+              <a:ext uri="{FF2B5EF4-FFF2-40B4-BE49-F238E27FC236}">
+                <a16:creationId xmlns:a16="http://schemas.microsoft.com/office/drawing/2014/main" id="{36B5C25C-11F8-48A2-9EBF-EB31D57061B6}"/>
+              </a:ext>
+            </a:extLst>
+          </p:cNvPr>
+          <p:cNvSpPr/>
+          <p:nvPr/>
+        </p:nvSpPr>
+        <p:spPr>
+          <a:xfrm>
+            <a:off x="-2" y="0"/>
+            <a:ext cx="269083" cy="1096963"/>
+          </a:xfrm>
+          <a:prstGeom prst="rect">
+            <a:avLst/>
+          </a:prstGeom>
+          <a:solidFill>
+            <a:schemeClr val="bg1"/>
+          </a:solidFill>
+          <a:ln>
+            <a:noFill/>
+          </a:ln>
+        </p:spPr>
+        <p:style>
+          <a:lnRef idx="2">
+            <a:schemeClr val="accent1">
+              <a:shade val="50000"/>
+            </a:schemeClr>
+          </a:lnRef>
+          <a:fillRef idx="1">
+            <a:schemeClr val="accent1"/>
+          </a:fillRef>
+          <a:effectRef idx="0">
+            <a:schemeClr val="accent1"/>
+          </a:effectRef>
+          <a:fontRef idx="minor">
+            <a:schemeClr val="lt1"/>
+          </a:fontRef>
+        </p:style>
+        <p:txBody>
+          <a:bodyPr rtlCol="0" anchor="ctr"/>
+          <a:lstStyle/>
+          <a:p>
+            <a:pPr algn="ctr"/>
+            <a:endParaRPr lang="en-US"/>
+          </a:p>
+        </p:txBody>
+      </p:sp>
+      <p:sp>
+        <p:nvSpPr>
+          <p:cNvPr id="11" name="Rectangle 10">
+            <a:extLst>
+              <a:ext uri="{FF2B5EF4-FFF2-40B4-BE49-F238E27FC236}">
+                <a16:creationId xmlns:a16="http://schemas.microsoft.com/office/drawing/2014/main" id="{901B6005-C546-4140-BDFD-DBA8BF6CF22B}"/>
+              </a:ext>
+            </a:extLst>
+          </p:cNvPr>
+          <p:cNvSpPr/>
+          <p:nvPr/>
+        </p:nvSpPr>
+        <p:spPr>
+          <a:xfrm>
+            <a:off x="5293519" y="-1"/>
+            <a:ext cx="269083" cy="1096963"/>
+          </a:xfrm>
+          <a:prstGeom prst="rect">
+            <a:avLst/>
+          </a:prstGeom>
+          <a:solidFill>
+            <a:schemeClr val="bg1"/>
+          </a:solidFill>
+          <a:ln>
+            <a:noFill/>
+          </a:ln>
+        </p:spPr>
+        <p:style>
+          <a:lnRef idx="2">
+            <a:schemeClr val="accent1">
+              <a:shade val="50000"/>
+            </a:schemeClr>
+          </a:lnRef>
+          <a:fillRef idx="1">
+            <a:schemeClr val="accent1"/>
+          </a:fillRef>
+          <a:effectRef idx="0">
+            <a:schemeClr val="accent1"/>
+          </a:effectRef>
+          <a:fontRef idx="minor">
+            <a:schemeClr val="lt1"/>
+          </a:fontRef>
+        </p:style>
+        <p:txBody>
+          <a:bodyPr rtlCol="0" anchor="ctr"/>
+          <a:lstStyle/>
+          <a:p>
+            <a:pPr algn="ctr"/>
+            <a:endParaRPr lang="en-US"/>
+          </a:p>
+        </p:txBody>
+      </p:sp>
+    </p:spTree>
+    <p:extLst>
+      <p:ext uri="{BB962C8B-B14F-4D97-AF65-F5344CB8AC3E}">
+        <p14:creationId xmlns:p14="http://schemas.microsoft.com/office/powerpoint/2010/main" val="3532955241"/>
+      </p:ext>
+    </p:extLst>
+  </p:cSld>
+  <p:clrMapOvr>
+    <a:masterClrMapping/>
+  </p:clrMapOvr>
+</p:sld>
+</file>
+
+<file path=ppt/slides/slide12.xml><?xml version="1.0" encoding="utf-8"?>
+<p:sld xmlns:a="http://schemas.openxmlformats.org/drawingml/2006/main" xmlns:r="http://schemas.openxmlformats.org/officeDocument/2006/relationships" xmlns:p="http://schemas.openxmlformats.org/presentationml/2006/main">
+  <p:cSld>
+    <p:spTree>
+      <p:nvGrpSpPr>
+        <p:cNvPr id="1" name=""/>
+        <p:cNvGrpSpPr/>
+        <p:nvPr/>
+      </p:nvGrpSpPr>
+      <p:grpSpPr>
+        <a:xfrm>
+          <a:off x="0" y="0"/>
+          <a:ext cx="0" cy="0"/>
+          <a:chOff x="0" y="0"/>
+          <a:chExt cx="0" cy="0"/>
+        </a:xfrm>
+      </p:grpSpPr>
+      <p:sp>
+        <p:nvSpPr>
+          <p:cNvPr id="6" name="Rectangle 5">
+            <a:extLst>
+              <a:ext uri="{FF2B5EF4-FFF2-40B4-BE49-F238E27FC236}">
+                <a16:creationId xmlns:a16="http://schemas.microsoft.com/office/drawing/2014/main" id="{140EBB1C-E574-4824-8739-E838CE96078D}"/>
+              </a:ext>
+            </a:extLst>
+          </p:cNvPr>
+          <p:cNvSpPr/>
+          <p:nvPr/>
+        </p:nvSpPr>
+        <p:spPr>
+          <a:xfrm>
+            <a:off x="0" y="296863"/>
+            <a:ext cx="2177808" cy="800100"/>
+          </a:xfrm>
+          <a:prstGeom prst="rect">
+            <a:avLst/>
+          </a:prstGeom>
+          <a:solidFill>
+            <a:srgbClr val="A9CF46"/>
+          </a:solidFill>
+          <a:ln>
+            <a:noFill/>
+          </a:ln>
+        </p:spPr>
+        <p:style>
+          <a:lnRef idx="2">
+            <a:schemeClr val="accent1">
+              <a:shade val="50000"/>
+            </a:schemeClr>
+          </a:lnRef>
+          <a:fillRef idx="1">
+            <a:schemeClr val="accent1"/>
+          </a:fillRef>
+          <a:effectRef idx="0">
+            <a:schemeClr val="accent1"/>
+          </a:effectRef>
+          <a:fontRef idx="minor">
+            <a:schemeClr val="lt1"/>
+          </a:fontRef>
+        </p:style>
+        <p:txBody>
+          <a:bodyPr rot="0" spcFirstLastPara="0" vertOverflow="overflow" horzOverflow="overflow" vert="horz" wrap="square" lIns="91440" tIns="45719" rIns="91440" bIns="45719" numCol="1" spcCol="0" rtlCol="0" fromWordArt="0" anchor="ctr" anchorCtr="0" forceAA="0" compatLnSpc="1">
+            <a:prstTxWarp prst="textNoShape">
+              <a:avLst/>
+            </a:prstTxWarp>
+            <a:noAutofit/>
+          </a:bodyPr>
+          <a:lstStyle/>
+          <a:p>
+            <a:pPr algn="ctr"/>
+            <a:endParaRPr lang="en-US"/>
+          </a:p>
+        </p:txBody>
+      </p:sp>
+      <p:sp>
+        <p:nvSpPr>
+          <p:cNvPr id="7" name="Rectangle 6">
+            <a:extLst>
+              <a:ext uri="{FF2B5EF4-FFF2-40B4-BE49-F238E27FC236}">
+                <a16:creationId xmlns:a16="http://schemas.microsoft.com/office/drawing/2014/main" id="{E139999D-85F3-4FA3-B90B-6E69F95DB000}"/>
+              </a:ext>
+            </a:extLst>
+          </p:cNvPr>
+          <p:cNvSpPr/>
+          <p:nvPr/>
+        </p:nvSpPr>
+        <p:spPr>
+          <a:xfrm>
+            <a:off x="3384794" y="296863"/>
+            <a:ext cx="2177808" cy="800100"/>
+          </a:xfrm>
+          <a:prstGeom prst="rect">
+            <a:avLst/>
+          </a:prstGeom>
+          <a:solidFill>
+            <a:srgbClr val="A9CF46"/>
+          </a:solidFill>
+          <a:ln>
+            <a:noFill/>
+          </a:ln>
+        </p:spPr>
+        <p:style>
+          <a:lnRef idx="2">
+            <a:schemeClr val="accent1">
+              <a:shade val="50000"/>
+            </a:schemeClr>
+          </a:lnRef>
+          <a:fillRef idx="1">
+            <a:schemeClr val="accent1"/>
+          </a:fillRef>
+          <a:effectRef idx="0">
+            <a:schemeClr val="accent1"/>
+          </a:effectRef>
+          <a:fontRef idx="minor">
+            <a:schemeClr val="lt1"/>
+          </a:fontRef>
+        </p:style>
+        <p:txBody>
+          <a:bodyPr rot="0" spcFirstLastPara="0" vertOverflow="overflow" horzOverflow="overflow" vert="horz" wrap="square" lIns="91440" tIns="45719" rIns="91440" bIns="45719" numCol="1" spcCol="0" rtlCol="0" fromWordArt="0" anchor="ctr" anchorCtr="0" forceAA="0" compatLnSpc="1">
+            <a:prstTxWarp prst="textNoShape">
+              <a:avLst/>
+            </a:prstTxWarp>
+            <a:noAutofit/>
+          </a:bodyPr>
+          <a:lstStyle/>
+          <a:p>
+            <a:pPr algn="ctr"/>
+            <a:endParaRPr lang="en-US"/>
+          </a:p>
+        </p:txBody>
+      </p:sp>
+      <p:sp>
+        <p:nvSpPr>
+          <p:cNvPr id="9" name="TextBox 8">
+            <a:extLst>
+              <a:ext uri="{FF2B5EF4-FFF2-40B4-BE49-F238E27FC236}">
+                <a16:creationId xmlns:a16="http://schemas.microsoft.com/office/drawing/2014/main" id="{0D0CA72B-F56B-4767-8F95-65783756DAB7}"/>
+              </a:ext>
+            </a:extLst>
+          </p:cNvPr>
+          <p:cNvSpPr txBox="1"/>
+          <p:nvPr/>
+        </p:nvSpPr>
+        <p:spPr>
+          <a:xfrm>
+            <a:off x="1965960" y="96749"/>
+            <a:ext cx="1630680" cy="1200329"/>
+          </a:xfrm>
+          <a:prstGeom prst="rect">
+            <a:avLst/>
+          </a:prstGeom>
+          <a:noFill/>
+        </p:spPr>
+        <p:txBody>
+          <a:bodyPr wrap="square" rtlCol="0">
+            <a:spAutoFit/>
+          </a:bodyPr>
+          <a:lstStyle/>
+          <a:p>
+            <a:pPr algn="ctr"/>
+            <a:r>
+              <a:rPr lang="en-US" sz="7200" dirty="0">
+                <a:latin typeface="Bahnschrift" panose="020B0502040204020203" pitchFamily="34" charset="0"/>
+              </a:rPr>
+              <a:t>12</a:t>
+            </a:r>
+          </a:p>
+        </p:txBody>
+      </p:sp>
+      <p:sp>
+        <p:nvSpPr>
+          <p:cNvPr id="10" name="Rectangle 9">
+            <a:extLst>
+              <a:ext uri="{FF2B5EF4-FFF2-40B4-BE49-F238E27FC236}">
+                <a16:creationId xmlns:a16="http://schemas.microsoft.com/office/drawing/2014/main" id="{36B5C25C-11F8-48A2-9EBF-EB31D57061B6}"/>
+              </a:ext>
+            </a:extLst>
+          </p:cNvPr>
+          <p:cNvSpPr/>
+          <p:nvPr/>
+        </p:nvSpPr>
+        <p:spPr>
+          <a:xfrm>
+            <a:off x="-2" y="0"/>
+            <a:ext cx="269083" cy="1096963"/>
+          </a:xfrm>
+          <a:prstGeom prst="rect">
+            <a:avLst/>
+          </a:prstGeom>
+          <a:solidFill>
+            <a:schemeClr val="bg1"/>
+          </a:solidFill>
+          <a:ln>
+            <a:noFill/>
+          </a:ln>
+        </p:spPr>
+        <p:style>
+          <a:lnRef idx="2">
+            <a:schemeClr val="accent1">
+              <a:shade val="50000"/>
+            </a:schemeClr>
+          </a:lnRef>
+          <a:fillRef idx="1">
+            <a:schemeClr val="accent1"/>
+          </a:fillRef>
+          <a:effectRef idx="0">
+            <a:schemeClr val="accent1"/>
+          </a:effectRef>
+          <a:fontRef idx="minor">
+            <a:schemeClr val="lt1"/>
+          </a:fontRef>
+        </p:style>
+        <p:txBody>
+          <a:bodyPr rtlCol="0" anchor="ctr"/>
+          <a:lstStyle/>
+          <a:p>
+            <a:pPr algn="ctr"/>
+            <a:endParaRPr lang="en-US"/>
+          </a:p>
+        </p:txBody>
+      </p:sp>
+      <p:sp>
+        <p:nvSpPr>
+          <p:cNvPr id="11" name="Rectangle 10">
+            <a:extLst>
+              <a:ext uri="{FF2B5EF4-FFF2-40B4-BE49-F238E27FC236}">
+                <a16:creationId xmlns:a16="http://schemas.microsoft.com/office/drawing/2014/main" id="{901B6005-C546-4140-BDFD-DBA8BF6CF22B}"/>
+              </a:ext>
+            </a:extLst>
+          </p:cNvPr>
+          <p:cNvSpPr/>
+          <p:nvPr/>
+        </p:nvSpPr>
+        <p:spPr>
+          <a:xfrm>
+            <a:off x="5293519" y="-1"/>
+            <a:ext cx="269083" cy="1096963"/>
+          </a:xfrm>
+          <a:prstGeom prst="rect">
+            <a:avLst/>
+          </a:prstGeom>
+          <a:solidFill>
+            <a:schemeClr val="bg1"/>
+          </a:solidFill>
+          <a:ln>
+            <a:noFill/>
+          </a:ln>
+        </p:spPr>
+        <p:style>
+          <a:lnRef idx="2">
+            <a:schemeClr val="accent1">
+              <a:shade val="50000"/>
+            </a:schemeClr>
+          </a:lnRef>
+          <a:fillRef idx="1">
+            <a:schemeClr val="accent1"/>
+          </a:fillRef>
+          <a:effectRef idx="0">
+            <a:schemeClr val="accent1"/>
+          </a:effectRef>
+          <a:fontRef idx="minor">
+            <a:schemeClr val="lt1"/>
+          </a:fontRef>
+        </p:style>
+        <p:txBody>
+          <a:bodyPr rtlCol="0" anchor="ctr"/>
+          <a:lstStyle/>
+          <a:p>
+            <a:pPr algn="ctr"/>
+            <a:endParaRPr lang="en-US"/>
+          </a:p>
+        </p:txBody>
+      </p:sp>
+    </p:spTree>
+    <p:extLst>
+      <p:ext uri="{BB962C8B-B14F-4D97-AF65-F5344CB8AC3E}">
+        <p14:creationId xmlns:p14="http://schemas.microsoft.com/office/powerpoint/2010/main" val="3188379781"/>
       </p:ext>
     </p:extLst>
   </p:cSld>
@@ -3287,7 +4149,7 @@
             <a:avLst/>
           </a:prstGeom>
           <a:solidFill>
-            <a:srgbClr val="E24234"/>
+            <a:srgbClr val="EC3237"/>
           </a:solidFill>
           <a:ln>
             <a:noFill/>
@@ -3344,7 +4206,7 @@
             <a:avLst/>
           </a:prstGeom>
           <a:solidFill>
-            <a:srgbClr val="E24234"/>
+            <a:srgbClr val="EC3237"/>
           </a:solidFill>
           <a:ln>
             <a:noFill/>
@@ -3573,7 +4435,7 @@
             <a:avLst/>
           </a:prstGeom>
           <a:solidFill>
-            <a:srgbClr val="203578"/>
+            <a:srgbClr val="00AFF0"/>
           </a:solidFill>
           <a:ln>
             <a:noFill/>
@@ -3630,7 +4492,7 @@
             <a:avLst/>
           </a:prstGeom>
           <a:solidFill>
-            <a:srgbClr val="203578"/>
+            <a:srgbClr val="00AFF0"/>
           </a:solidFill>
           <a:ln>
             <a:noFill/>
@@ -3859,7 +4721,7 @@
             <a:avLst/>
           </a:prstGeom>
           <a:solidFill>
-            <a:srgbClr val="FCA457"/>
+            <a:srgbClr val="F26B29"/>
           </a:solidFill>
           <a:ln>
             <a:noFill/>
@@ -3916,7 +4778,7 @@
             <a:avLst/>
           </a:prstGeom>
           <a:solidFill>
-            <a:srgbClr val="FCA457"/>
+            <a:srgbClr val="F26B29"/>
           </a:solidFill>
           <a:ln>
             <a:noFill/>
@@ -4145,7 +5007,7 @@
             <a:avLst/>
           </a:prstGeom>
           <a:solidFill>
-            <a:srgbClr val="346744"/>
+            <a:srgbClr val="00874F"/>
           </a:solidFill>
           <a:ln>
             <a:noFill/>
@@ -4202,7 +5064,7 @@
             <a:avLst/>
           </a:prstGeom>
           <a:solidFill>
-            <a:srgbClr val="346744"/>
+            <a:srgbClr val="00874F"/>
           </a:solidFill>
           <a:ln>
             <a:noFill/>
@@ -4431,7 +5293,7 @@
             <a:avLst/>
           </a:prstGeom>
           <a:solidFill>
-            <a:srgbClr val="FEB9CF"/>
+            <a:srgbClr val="EB268F"/>
           </a:solidFill>
           <a:ln>
             <a:noFill/>
@@ -4488,7 +5350,7 @@
             <a:avLst/>
           </a:prstGeom>
           <a:solidFill>
-            <a:srgbClr val="FEB9CF"/>
+            <a:srgbClr val="EB268F"/>
           </a:solidFill>
           <a:ln>
             <a:noFill/>
@@ -4717,7 +5579,7 @@
             <a:avLst/>
           </a:prstGeom>
           <a:solidFill>
-            <a:srgbClr val="60539D"/>
+            <a:srgbClr val="3E4095"/>
           </a:solidFill>
           <a:ln>
             <a:noFill/>
@@ -4774,7 +5636,7 @@
             <a:avLst/>
           </a:prstGeom>
           <a:solidFill>
-            <a:srgbClr val="60539D"/>
+            <a:srgbClr val="3E4095"/>
           </a:solidFill>
           <a:ln>
             <a:noFill/>
@@ -5003,7 +5865,7 @@
             <a:avLst/>
           </a:prstGeom>
           <a:solidFill>
-            <a:schemeClr val="tx2"/>
+            <a:srgbClr val="27BEB5"/>
           </a:solidFill>
           <a:ln>
             <a:noFill/>
@@ -5060,7 +5922,7 @@
             <a:avLst/>
           </a:prstGeom>
           <a:solidFill>
-            <a:schemeClr val="tx2"/>
+            <a:srgbClr val="27BEB5"/>
           </a:solidFill>
           <a:ln>
             <a:noFill/>
@@ -5242,6 +6104,292 @@
     <p:extLst>
       <p:ext uri="{BB962C8B-B14F-4D97-AF65-F5344CB8AC3E}">
         <p14:creationId xmlns:p14="http://schemas.microsoft.com/office/powerpoint/2010/main" val="2388337670"/>
+      </p:ext>
+    </p:extLst>
+  </p:cSld>
+  <p:clrMapOvr>
+    <a:masterClrMapping/>
+  </p:clrMapOvr>
+</p:sld>
+</file>
+
+<file path=ppt/slides/slide9.xml><?xml version="1.0" encoding="utf-8"?>
+<p:sld xmlns:a="http://schemas.openxmlformats.org/drawingml/2006/main" xmlns:r="http://schemas.openxmlformats.org/officeDocument/2006/relationships" xmlns:p="http://schemas.openxmlformats.org/presentationml/2006/main">
+  <p:cSld>
+    <p:spTree>
+      <p:nvGrpSpPr>
+        <p:cNvPr id="1" name=""/>
+        <p:cNvGrpSpPr/>
+        <p:nvPr/>
+      </p:nvGrpSpPr>
+      <p:grpSpPr>
+        <a:xfrm>
+          <a:off x="0" y="0"/>
+          <a:ext cx="0" cy="0"/>
+          <a:chOff x="0" y="0"/>
+          <a:chExt cx="0" cy="0"/>
+        </a:xfrm>
+      </p:grpSpPr>
+      <p:sp>
+        <p:nvSpPr>
+          <p:cNvPr id="6" name="Rectangle 5">
+            <a:extLst>
+              <a:ext uri="{FF2B5EF4-FFF2-40B4-BE49-F238E27FC236}">
+                <a16:creationId xmlns:a16="http://schemas.microsoft.com/office/drawing/2014/main" id="{140EBB1C-E574-4824-8739-E838CE96078D}"/>
+              </a:ext>
+            </a:extLst>
+          </p:cNvPr>
+          <p:cNvSpPr/>
+          <p:nvPr/>
+        </p:nvSpPr>
+        <p:spPr>
+          <a:xfrm>
+            <a:off x="0" y="296863"/>
+            <a:ext cx="2177808" cy="800100"/>
+          </a:xfrm>
+          <a:prstGeom prst="rect">
+            <a:avLst/>
+          </a:prstGeom>
+          <a:solidFill>
+            <a:srgbClr val="A9518B"/>
+          </a:solidFill>
+          <a:ln>
+            <a:noFill/>
+          </a:ln>
+        </p:spPr>
+        <p:style>
+          <a:lnRef idx="2">
+            <a:schemeClr val="accent1">
+              <a:shade val="50000"/>
+            </a:schemeClr>
+          </a:lnRef>
+          <a:fillRef idx="1">
+            <a:schemeClr val="accent1"/>
+          </a:fillRef>
+          <a:effectRef idx="0">
+            <a:schemeClr val="accent1"/>
+          </a:effectRef>
+          <a:fontRef idx="minor">
+            <a:schemeClr val="lt1"/>
+          </a:fontRef>
+        </p:style>
+        <p:txBody>
+          <a:bodyPr rot="0" spcFirstLastPara="0" vertOverflow="overflow" horzOverflow="overflow" vert="horz" wrap="square" lIns="91440" tIns="45719" rIns="91440" bIns="45719" numCol="1" spcCol="0" rtlCol="0" fromWordArt="0" anchor="ctr" anchorCtr="0" forceAA="0" compatLnSpc="1">
+            <a:prstTxWarp prst="textNoShape">
+              <a:avLst/>
+            </a:prstTxWarp>
+            <a:noAutofit/>
+          </a:bodyPr>
+          <a:lstStyle/>
+          <a:p>
+            <a:pPr algn="ctr"/>
+            <a:endParaRPr lang="en-US"/>
+          </a:p>
+        </p:txBody>
+      </p:sp>
+      <p:sp>
+        <p:nvSpPr>
+          <p:cNvPr id="7" name="Rectangle 6">
+            <a:extLst>
+              <a:ext uri="{FF2B5EF4-FFF2-40B4-BE49-F238E27FC236}">
+                <a16:creationId xmlns:a16="http://schemas.microsoft.com/office/drawing/2014/main" id="{E139999D-85F3-4FA3-B90B-6E69F95DB000}"/>
+              </a:ext>
+            </a:extLst>
+          </p:cNvPr>
+          <p:cNvSpPr/>
+          <p:nvPr/>
+        </p:nvSpPr>
+        <p:spPr>
+          <a:xfrm>
+            <a:off x="3384794" y="296863"/>
+            <a:ext cx="2177808" cy="800100"/>
+          </a:xfrm>
+          <a:prstGeom prst="rect">
+            <a:avLst/>
+          </a:prstGeom>
+          <a:solidFill>
+            <a:srgbClr val="A9518B"/>
+          </a:solidFill>
+          <a:ln>
+            <a:noFill/>
+          </a:ln>
+        </p:spPr>
+        <p:style>
+          <a:lnRef idx="2">
+            <a:schemeClr val="accent1">
+              <a:shade val="50000"/>
+            </a:schemeClr>
+          </a:lnRef>
+          <a:fillRef idx="1">
+            <a:schemeClr val="accent1"/>
+          </a:fillRef>
+          <a:effectRef idx="0">
+            <a:schemeClr val="accent1"/>
+          </a:effectRef>
+          <a:fontRef idx="minor">
+            <a:schemeClr val="lt1"/>
+          </a:fontRef>
+        </p:style>
+        <p:txBody>
+          <a:bodyPr rot="0" spcFirstLastPara="0" vertOverflow="overflow" horzOverflow="overflow" vert="horz" wrap="square" lIns="91440" tIns="45719" rIns="91440" bIns="45719" numCol="1" spcCol="0" rtlCol="0" fromWordArt="0" anchor="ctr" anchorCtr="0" forceAA="0" compatLnSpc="1">
+            <a:prstTxWarp prst="textNoShape">
+              <a:avLst/>
+            </a:prstTxWarp>
+            <a:noAutofit/>
+          </a:bodyPr>
+          <a:lstStyle/>
+          <a:p>
+            <a:pPr algn="ctr"/>
+            <a:endParaRPr lang="en-US"/>
+          </a:p>
+        </p:txBody>
+      </p:sp>
+      <p:sp>
+        <p:nvSpPr>
+          <p:cNvPr id="9" name="TextBox 8">
+            <a:extLst>
+              <a:ext uri="{FF2B5EF4-FFF2-40B4-BE49-F238E27FC236}">
+                <a16:creationId xmlns:a16="http://schemas.microsoft.com/office/drawing/2014/main" id="{0D0CA72B-F56B-4767-8F95-65783756DAB7}"/>
+              </a:ext>
+            </a:extLst>
+          </p:cNvPr>
+          <p:cNvSpPr txBox="1"/>
+          <p:nvPr/>
+        </p:nvSpPr>
+        <p:spPr>
+          <a:xfrm>
+            <a:off x="1965960" y="96749"/>
+            <a:ext cx="1630680" cy="1200329"/>
+          </a:xfrm>
+          <a:prstGeom prst="rect">
+            <a:avLst/>
+          </a:prstGeom>
+          <a:noFill/>
+        </p:spPr>
+        <p:txBody>
+          <a:bodyPr wrap="square" rtlCol="0">
+            <a:spAutoFit/>
+          </a:bodyPr>
+          <a:lstStyle/>
+          <a:p>
+            <a:pPr algn="ctr"/>
+            <a:r>
+              <a:rPr lang="en-US" sz="7200" dirty="0">
+                <a:latin typeface="Bahnschrift" panose="020B0502040204020203" pitchFamily="34" charset="0"/>
+              </a:rPr>
+              <a:t>09</a:t>
+            </a:r>
+          </a:p>
+        </p:txBody>
+      </p:sp>
+      <p:sp>
+        <p:nvSpPr>
+          <p:cNvPr id="10" name="Rectangle 9">
+            <a:extLst>
+              <a:ext uri="{FF2B5EF4-FFF2-40B4-BE49-F238E27FC236}">
+                <a16:creationId xmlns:a16="http://schemas.microsoft.com/office/drawing/2014/main" id="{6209F9F6-E8E1-43A1-ABFD-ABC478853619}"/>
+              </a:ext>
+            </a:extLst>
+          </p:cNvPr>
+          <p:cNvSpPr/>
+          <p:nvPr/>
+        </p:nvSpPr>
+        <p:spPr>
+          <a:xfrm>
+            <a:off x="-2" y="0"/>
+            <a:ext cx="269083" cy="1096963"/>
+          </a:xfrm>
+          <a:prstGeom prst="rect">
+            <a:avLst/>
+          </a:prstGeom>
+          <a:solidFill>
+            <a:schemeClr val="bg1"/>
+          </a:solidFill>
+          <a:ln>
+            <a:noFill/>
+          </a:ln>
+        </p:spPr>
+        <p:style>
+          <a:lnRef idx="2">
+            <a:schemeClr val="accent1">
+              <a:shade val="50000"/>
+            </a:schemeClr>
+          </a:lnRef>
+          <a:fillRef idx="1">
+            <a:schemeClr val="accent1"/>
+          </a:fillRef>
+          <a:effectRef idx="0">
+            <a:schemeClr val="accent1"/>
+          </a:effectRef>
+          <a:fontRef idx="minor">
+            <a:schemeClr val="lt1"/>
+          </a:fontRef>
+        </p:style>
+        <p:txBody>
+          <a:bodyPr rtlCol="0" anchor="ctr"/>
+          <a:lstStyle/>
+          <a:p>
+            <a:pPr algn="ctr"/>
+            <a:endParaRPr lang="en-US"/>
+          </a:p>
+        </p:txBody>
+      </p:sp>
+      <p:sp>
+        <p:nvSpPr>
+          <p:cNvPr id="11" name="Rectangle 10">
+            <a:extLst>
+              <a:ext uri="{FF2B5EF4-FFF2-40B4-BE49-F238E27FC236}">
+                <a16:creationId xmlns:a16="http://schemas.microsoft.com/office/drawing/2014/main" id="{A1B08100-CE2F-4EE2-AB49-F7C6F524CB60}"/>
+              </a:ext>
+            </a:extLst>
+          </p:cNvPr>
+          <p:cNvSpPr/>
+          <p:nvPr/>
+        </p:nvSpPr>
+        <p:spPr>
+          <a:xfrm>
+            <a:off x="5293519" y="-1"/>
+            <a:ext cx="269083" cy="1096963"/>
+          </a:xfrm>
+          <a:prstGeom prst="rect">
+            <a:avLst/>
+          </a:prstGeom>
+          <a:solidFill>
+            <a:schemeClr val="bg1"/>
+          </a:solidFill>
+          <a:ln>
+            <a:noFill/>
+          </a:ln>
+        </p:spPr>
+        <p:style>
+          <a:lnRef idx="2">
+            <a:schemeClr val="accent1">
+              <a:shade val="50000"/>
+            </a:schemeClr>
+          </a:lnRef>
+          <a:fillRef idx="1">
+            <a:schemeClr val="accent1"/>
+          </a:fillRef>
+          <a:effectRef idx="0">
+            <a:schemeClr val="accent1"/>
+          </a:effectRef>
+          <a:fontRef idx="minor">
+            <a:schemeClr val="lt1"/>
+          </a:fontRef>
+        </p:style>
+        <p:txBody>
+          <a:bodyPr rtlCol="0" anchor="ctr"/>
+          <a:lstStyle/>
+          <a:p>
+            <a:pPr algn="ctr"/>
+            <a:endParaRPr lang="en-US"/>
+          </a:p>
+        </p:txBody>
+      </p:sp>
+    </p:spTree>
+    <p:extLst>
+      <p:ext uri="{BB962C8B-B14F-4D97-AF65-F5344CB8AC3E}">
+        <p14:creationId xmlns:p14="http://schemas.microsoft.com/office/powerpoint/2010/main" val="484979572"/>
       </p:ext>
     </p:extLst>
   </p:cSld>

</xml_diff>